<commit_message>
Updated with initial data analysis
</commit_message>
<xml_diff>
--- a/dra-1.pptx
+++ b/dra-1.pptx
@@ -14,6 +14,9 @@
     <p:sldId id="262" r:id="rId8"/>
     <p:sldId id="263" r:id="rId9"/>
     <p:sldId id="267" r:id="rId10"/>
+    <p:sldId id="268" r:id="rId11"/>
+    <p:sldId id="270" r:id="rId12"/>
+    <p:sldId id="269" r:id="rId13"/>
   </p:sldIdLst>
   <p:sldSz cx="12192000" cy="6858000"/>
   <p:notesSz cx="6858000" cy="9144000"/>
@@ -112,6 +115,11 @@
       </a:defRPr>
     </a:lvl9pPr>
   </p:defaultTextStyle>
+  <p:extLst>
+    <p:ext uri="{EFAFB233-063F-42B5-8137-9DF3F51BA10A}">
+      <p15:sldGuideLst xmlns:p15="http://schemas.microsoft.com/office/powerpoint/2012/main"/>
+    </p:ext>
+  </p:extLst>
 </p:presentation>
 </file>
 
@@ -262,7 +270,7 @@
           <a:p>
             <a:fld id="{2ED07294-46AD-CC4C-B5BD-6ACEA0B69DAC}" type="datetimeFigureOut">
               <a:rPr lang="en-US" smtClean="0"/>
-              <a:t>12/29/24</a:t>
+              <a:t>1/26/25</a:t>
             </a:fld>
             <a:endParaRPr lang="en-US"/>
           </a:p>
@@ -460,7 +468,7 @@
           <a:p>
             <a:fld id="{2ED07294-46AD-CC4C-B5BD-6ACEA0B69DAC}" type="datetimeFigureOut">
               <a:rPr lang="en-US" smtClean="0"/>
-              <a:t>12/29/24</a:t>
+              <a:t>1/26/25</a:t>
             </a:fld>
             <a:endParaRPr lang="en-US"/>
           </a:p>
@@ -668,7 +676,7 @@
           <a:p>
             <a:fld id="{2ED07294-46AD-CC4C-B5BD-6ACEA0B69DAC}" type="datetimeFigureOut">
               <a:rPr lang="en-US" smtClean="0"/>
-              <a:t>12/29/24</a:t>
+              <a:t>1/26/25</a:t>
             </a:fld>
             <a:endParaRPr lang="en-US"/>
           </a:p>
@@ -866,7 +874,7 @@
           <a:p>
             <a:fld id="{2ED07294-46AD-CC4C-B5BD-6ACEA0B69DAC}" type="datetimeFigureOut">
               <a:rPr lang="en-US" smtClean="0"/>
-              <a:t>12/29/24</a:t>
+              <a:t>1/26/25</a:t>
             </a:fld>
             <a:endParaRPr lang="en-US"/>
           </a:p>
@@ -1141,7 +1149,7 @@
           <a:p>
             <a:fld id="{2ED07294-46AD-CC4C-B5BD-6ACEA0B69DAC}" type="datetimeFigureOut">
               <a:rPr lang="en-US" smtClean="0"/>
-              <a:t>12/29/24</a:t>
+              <a:t>1/26/25</a:t>
             </a:fld>
             <a:endParaRPr lang="en-US"/>
           </a:p>
@@ -1406,7 +1414,7 @@
           <a:p>
             <a:fld id="{2ED07294-46AD-CC4C-B5BD-6ACEA0B69DAC}" type="datetimeFigureOut">
               <a:rPr lang="en-US" smtClean="0"/>
-              <a:t>12/29/24</a:t>
+              <a:t>1/26/25</a:t>
             </a:fld>
             <a:endParaRPr lang="en-US"/>
           </a:p>
@@ -1818,7 +1826,7 @@
           <a:p>
             <a:fld id="{2ED07294-46AD-CC4C-B5BD-6ACEA0B69DAC}" type="datetimeFigureOut">
               <a:rPr lang="en-US" smtClean="0"/>
-              <a:t>12/29/24</a:t>
+              <a:t>1/26/25</a:t>
             </a:fld>
             <a:endParaRPr lang="en-US"/>
           </a:p>
@@ -1959,7 +1967,7 @@
           <a:p>
             <a:fld id="{2ED07294-46AD-CC4C-B5BD-6ACEA0B69DAC}" type="datetimeFigureOut">
               <a:rPr lang="en-US" smtClean="0"/>
-              <a:t>12/29/24</a:t>
+              <a:t>1/26/25</a:t>
             </a:fld>
             <a:endParaRPr lang="en-US"/>
           </a:p>
@@ -2072,7 +2080,7 @@
           <a:p>
             <a:fld id="{2ED07294-46AD-CC4C-B5BD-6ACEA0B69DAC}" type="datetimeFigureOut">
               <a:rPr lang="en-US" smtClean="0"/>
-              <a:t>12/29/24</a:t>
+              <a:t>1/26/25</a:t>
             </a:fld>
             <a:endParaRPr lang="en-US"/>
           </a:p>
@@ -2383,7 +2391,7 @@
           <a:p>
             <a:fld id="{2ED07294-46AD-CC4C-B5BD-6ACEA0B69DAC}" type="datetimeFigureOut">
               <a:rPr lang="en-US" smtClean="0"/>
-              <a:t>12/29/24</a:t>
+              <a:t>1/26/25</a:t>
             </a:fld>
             <a:endParaRPr lang="en-US"/>
           </a:p>
@@ -2671,7 +2679,7 @@
           <a:p>
             <a:fld id="{2ED07294-46AD-CC4C-B5BD-6ACEA0B69DAC}" type="datetimeFigureOut">
               <a:rPr lang="en-US" smtClean="0"/>
-              <a:t>12/29/24</a:t>
+              <a:t>1/26/25</a:t>
             </a:fld>
             <a:endParaRPr lang="en-US"/>
           </a:p>
@@ -2912,7 +2920,7 @@
           <a:p>
             <a:fld id="{2ED07294-46AD-CC4C-B5BD-6ACEA0B69DAC}" type="datetimeFigureOut">
               <a:rPr lang="en-US" smtClean="0"/>
-              <a:t>12/29/24</a:t>
+              <a:t>1/26/25</a:t>
             </a:fld>
             <a:endParaRPr lang="en-US"/>
           </a:p>
@@ -3395,6 +3403,288 @@
 </p:sld>
 </file>
 
+<file path=ppt/slides/slide10.xml><?xml version="1.0" encoding="utf-8"?>
+<p:sld xmlns:a="http://schemas.openxmlformats.org/drawingml/2006/main" xmlns:r="http://schemas.openxmlformats.org/officeDocument/2006/relationships" xmlns:p="http://schemas.openxmlformats.org/presentationml/2006/main">
+  <p:cSld>
+    <p:spTree>
+      <p:nvGrpSpPr>
+        <p:cNvPr id="1" name=""/>
+        <p:cNvGrpSpPr/>
+        <p:nvPr/>
+      </p:nvGrpSpPr>
+      <p:grpSpPr>
+        <a:xfrm>
+          <a:off x="0" y="0"/>
+          <a:ext cx="0" cy="0"/>
+          <a:chOff x="0" y="0"/>
+          <a:chExt cx="0" cy="0"/>
+        </a:xfrm>
+      </p:grpSpPr>
+      <p:sp>
+        <p:nvSpPr>
+          <p:cNvPr id="2" name="Title 1">
+            <a:extLst>
+              <a:ext uri="{FF2B5EF4-FFF2-40B4-BE49-F238E27FC236}">
+                <a16:creationId xmlns:a16="http://schemas.microsoft.com/office/drawing/2014/main" id="{37C6E537-5891-328E-F651-D02862F2DAFE}"/>
+              </a:ext>
+            </a:extLst>
+          </p:cNvPr>
+          <p:cNvSpPr>
+            <a:spLocks noGrp="1"/>
+          </p:cNvSpPr>
+          <p:nvPr>
+            <p:ph type="title"/>
+          </p:nvPr>
+        </p:nvSpPr>
+        <p:spPr/>
+        <p:txBody>
+          <a:bodyPr/>
+          <a:lstStyle/>
+          <a:p>
+            <a:r>
+              <a:rPr lang="en-US" dirty="0"/>
+              <a:t>Initial data analysis</a:t>
+            </a:r>
+          </a:p>
+        </p:txBody>
+      </p:sp>
+      <p:sp>
+        <p:nvSpPr>
+          <p:cNvPr id="3" name="Content Placeholder 2">
+            <a:extLst>
+              <a:ext uri="{FF2B5EF4-FFF2-40B4-BE49-F238E27FC236}">
+                <a16:creationId xmlns:a16="http://schemas.microsoft.com/office/drawing/2014/main" id="{4788BBFB-8A69-2DD1-AE63-F969D7C1EB30}"/>
+              </a:ext>
+            </a:extLst>
+          </p:cNvPr>
+          <p:cNvSpPr>
+            <a:spLocks noGrp="1"/>
+          </p:cNvSpPr>
+          <p:nvPr>
+            <p:ph idx="1"/>
+          </p:nvPr>
+        </p:nvSpPr>
+        <p:spPr/>
+        <p:txBody>
+          <a:bodyPr/>
+          <a:lstStyle/>
+          <a:p>
+            <a:r>
+              <a:rPr lang="en-US" dirty="0"/>
+              <a:t>I picked a network traffic data from Kaggle-</a:t>
+            </a:r>
+            <a:r>
+              <a:rPr lang="en-US" dirty="0">
+                <a:hlinkClick r:id="rId2"/>
+              </a:rPr>
+              <a:t>https://www.kaggle.com/code/ernie55ernie/time-series-visualization-of-network-activity?select=Mirai_Botnet.csv</a:t>
+            </a:r>
+            <a:endParaRPr lang="en-US" dirty="0"/>
+          </a:p>
+          <a:p>
+            <a:pPr algn="just"/>
+            <a:r>
+              <a:rPr lang="en-US" dirty="0"/>
+              <a:t>I used PCA clustering technique to group network services in a cluster. A network service is represented by the destination IP address of the traffic  streams.</a:t>
+            </a:r>
+          </a:p>
+          <a:p>
+            <a:pPr algn="just"/>
+            <a:r>
+              <a:rPr lang="en-US" dirty="0"/>
+              <a:t>An IP address consists of a network address and a host address using octet value of the IP address, I split the destination IP address in the octet and used octet as the PCA classification feature (python notebook is uploaded in the git repo).</a:t>
+            </a:r>
+          </a:p>
+        </p:txBody>
+      </p:sp>
+    </p:spTree>
+    <p:extLst>
+      <p:ext uri="{BB962C8B-B14F-4D97-AF65-F5344CB8AC3E}">
+        <p14:creationId xmlns:p14="http://schemas.microsoft.com/office/powerpoint/2010/main" val="244015740"/>
+      </p:ext>
+    </p:extLst>
+  </p:cSld>
+  <p:clrMapOvr>
+    <a:masterClrMapping/>
+  </p:clrMapOvr>
+</p:sld>
+</file>
+
+<file path=ppt/slides/slide11.xml><?xml version="1.0" encoding="utf-8"?>
+<p:sld xmlns:a="http://schemas.openxmlformats.org/drawingml/2006/main" xmlns:r="http://schemas.openxmlformats.org/officeDocument/2006/relationships" xmlns:p="http://schemas.openxmlformats.org/presentationml/2006/main">
+  <p:cSld>
+    <p:spTree>
+      <p:nvGrpSpPr>
+        <p:cNvPr id="1" name=""/>
+        <p:cNvGrpSpPr/>
+        <p:nvPr/>
+      </p:nvGrpSpPr>
+      <p:grpSpPr>
+        <a:xfrm>
+          <a:off x="0" y="0"/>
+          <a:ext cx="0" cy="0"/>
+          <a:chOff x="0" y="0"/>
+          <a:chExt cx="0" cy="0"/>
+        </a:xfrm>
+      </p:grpSpPr>
+      <p:sp>
+        <p:nvSpPr>
+          <p:cNvPr id="2" name="Title 1">
+            <a:extLst>
+              <a:ext uri="{FF2B5EF4-FFF2-40B4-BE49-F238E27FC236}">
+                <a16:creationId xmlns:a16="http://schemas.microsoft.com/office/drawing/2014/main" id="{293EDA57-ECA8-BA2C-D2D8-67F97DCF25BF}"/>
+              </a:ext>
+            </a:extLst>
+          </p:cNvPr>
+          <p:cNvSpPr>
+            <a:spLocks noGrp="1"/>
+          </p:cNvSpPr>
+          <p:nvPr>
+            <p:ph type="title"/>
+          </p:nvPr>
+        </p:nvSpPr>
+        <p:spPr/>
+        <p:txBody>
+          <a:bodyPr/>
+          <a:lstStyle/>
+          <a:p>
+            <a:r>
+              <a:rPr lang="en-US" dirty="0"/>
+              <a:t>PCA clustering- destination IP address</a:t>
+            </a:r>
+          </a:p>
+        </p:txBody>
+      </p:sp>
+      <p:sp>
+        <p:nvSpPr>
+          <p:cNvPr id="3" name="Content Placeholder 2">
+            <a:extLst>
+              <a:ext uri="{FF2B5EF4-FFF2-40B4-BE49-F238E27FC236}">
+                <a16:creationId xmlns:a16="http://schemas.microsoft.com/office/drawing/2014/main" id="{804F8A85-A01C-FB46-4A96-D2749DD1BCB4}"/>
+              </a:ext>
+            </a:extLst>
+          </p:cNvPr>
+          <p:cNvSpPr>
+            <a:spLocks noGrp="1"/>
+          </p:cNvSpPr>
+          <p:nvPr>
+            <p:ph idx="1"/>
+          </p:nvPr>
+        </p:nvSpPr>
+        <p:spPr/>
+        <p:txBody>
+          <a:bodyPr/>
+          <a:lstStyle/>
+          <a:p>
+            <a:pPr algn="just"/>
+            <a:r>
+              <a:rPr lang="en-US" dirty="0"/>
+              <a:t>Using octet in the destination IP address, we clustered IP address using IP address’s octet value</a:t>
+            </a:r>
+          </a:p>
+          <a:p>
+            <a:pPr algn="just"/>
+            <a:r>
+              <a:rPr lang="en-US" dirty="0"/>
+              <a:t>From the dataset and PCA on destination address, we get 8 clusters of services. Cluster is shown in the next slide</a:t>
+            </a:r>
+          </a:p>
+          <a:p>
+            <a:r>
+              <a:rPr lang="en-US" dirty="0"/>
+              <a:t>Next task-</a:t>
+            </a:r>
+          </a:p>
+          <a:p>
+            <a:pPr lvl="1" algn="just"/>
+            <a:r>
+              <a:rPr lang="en-US" dirty="0"/>
+              <a:t>After creating clusters of destination IP address, we can use classification technique </a:t>
+            </a:r>
+            <a:r>
+              <a:rPr lang="en-US" dirty="0" err="1"/>
+              <a:t>e.g</a:t>
+            </a:r>
+            <a:r>
+              <a:rPr lang="en-US" dirty="0"/>
+              <a:t>, n-nearest neighbor on the traffic coming out of VM to see which cluster that VM can be mapped to and assign the physical server accordingly.</a:t>
+            </a:r>
+          </a:p>
+        </p:txBody>
+      </p:sp>
+    </p:spTree>
+    <p:extLst>
+      <p:ext uri="{BB962C8B-B14F-4D97-AF65-F5344CB8AC3E}">
+        <p14:creationId xmlns:p14="http://schemas.microsoft.com/office/powerpoint/2010/main" val="2528584012"/>
+      </p:ext>
+    </p:extLst>
+  </p:cSld>
+  <p:clrMapOvr>
+    <a:masterClrMapping/>
+  </p:clrMapOvr>
+</p:sld>
+</file>
+
+<file path=ppt/slides/slide12.xml><?xml version="1.0" encoding="utf-8"?>
+<p:sld xmlns:a="http://schemas.openxmlformats.org/drawingml/2006/main" xmlns:r="http://schemas.openxmlformats.org/officeDocument/2006/relationships" xmlns:p="http://schemas.openxmlformats.org/presentationml/2006/main">
+  <p:cSld>
+    <p:spTree>
+      <p:nvGrpSpPr>
+        <p:cNvPr id="1" name=""/>
+        <p:cNvGrpSpPr/>
+        <p:nvPr/>
+      </p:nvGrpSpPr>
+      <p:grpSpPr>
+        <a:xfrm>
+          <a:off x="0" y="0"/>
+          <a:ext cx="0" cy="0"/>
+          <a:chOff x="0" y="0"/>
+          <a:chExt cx="0" cy="0"/>
+        </a:xfrm>
+      </p:grpSpPr>
+      <p:pic>
+        <p:nvPicPr>
+          <p:cNvPr id="5" name="Picture 4" descr="A diagram with many colored dots&#10;&#10;AI-generated content may be incorrect.">
+            <a:extLst>
+              <a:ext uri="{FF2B5EF4-FFF2-40B4-BE49-F238E27FC236}">
+                <a16:creationId xmlns:a16="http://schemas.microsoft.com/office/drawing/2014/main" id="{F5075280-877B-C933-74BD-2B72AF592398}"/>
+              </a:ext>
+            </a:extLst>
+          </p:cNvPr>
+          <p:cNvPicPr>
+            <a:picLocks noChangeAspect="1"/>
+          </p:cNvPicPr>
+          <p:nvPr/>
+        </p:nvPicPr>
+        <p:blipFill>
+          <a:blip r:embed="rId2"/>
+          <a:stretch>
+            <a:fillRect/>
+          </a:stretch>
+        </p:blipFill>
+        <p:spPr>
+          <a:xfrm>
+            <a:off x="2667000" y="0"/>
+            <a:ext cx="6858000" cy="6858000"/>
+          </a:xfrm>
+          <a:prstGeom prst="rect">
+            <a:avLst/>
+          </a:prstGeom>
+        </p:spPr>
+      </p:pic>
+    </p:spTree>
+    <p:extLst>
+      <p:ext uri="{BB962C8B-B14F-4D97-AF65-F5344CB8AC3E}">
+        <p14:creationId xmlns:p14="http://schemas.microsoft.com/office/powerpoint/2010/main" val="2954518108"/>
+      </p:ext>
+    </p:extLst>
+  </p:cSld>
+  <p:clrMapOvr>
+    <a:masterClrMapping/>
+  </p:clrMapOvr>
+</p:sld>
+</file>
+
 <file path=ppt/slides/slide2.xml><?xml version="1.0" encoding="utf-8"?>
 <p:sld xmlns:a="http://schemas.openxmlformats.org/drawingml/2006/main" xmlns:r="http://schemas.openxmlformats.org/officeDocument/2006/relationships" xmlns:p="http://schemas.openxmlformats.org/presentationml/2006/main">
   <p:cSld>
@@ -4190,7 +4480,9 @@
         </p:nvSpPr>
         <p:spPr/>
         <p:txBody>
-          <a:bodyPr/>
+          <a:bodyPr>
+            <a:normAutofit lnSpcReduction="10000"/>
+          </a:bodyPr>
           <a:lstStyle/>
           <a:p>
             <a:r>
@@ -4202,38 +4494,21 @@
             <a:endParaRPr lang="en-US" dirty="0"/>
           </a:p>
           <a:p>
+            <a:pPr algn="just"/>
+            <a:r>
+              <a:rPr lang="en-US" dirty="0"/>
+              <a:t>Target- From the above data- we want to assign VM to the physical server based on following parameter described in the initial slides-</a:t>
+            </a:r>
+          </a:p>
+          <a:p>
+            <a:pPr algn="just"/>
+            <a:r>
+              <a:rPr lang="en-US" dirty="0"/>
+              <a:t>&gt;&gt;Grouping of VMs with similar network access. E.g., VM can be assigned to different groups in an organization e.g., Engineering group, sales and marketing group etc. It can be expected engineering group will use similar services and thus can be grouped together and similarly for sales and marketing team grouping. A model can learn this pattern and group VMs together.</a:t>
+            </a:r>
+          </a:p>
+          <a:p>
             <a:endParaRPr lang="en-US" dirty="0"/>
-          </a:p>
-          <a:p>
-            <a:pPr algn="just"/>
-            <a:r>
-              <a:rPr lang="en-US" dirty="0"/>
-              <a:t>Above data has timeseries view of data access via a </a:t>
-            </a:r>
-            <a:r>
-              <a:rPr lang="en-US" dirty="0" err="1"/>
-              <a:t>srcip</a:t>
-            </a:r>
-            <a:r>
-              <a:rPr lang="en-US" dirty="0"/>
-              <a:t> and </a:t>
-            </a:r>
-            <a:r>
-              <a:rPr lang="en-US" dirty="0" err="1"/>
-              <a:t>dest_ip</a:t>
-            </a:r>
-            <a:r>
-              <a:rPr lang="en-US" dirty="0"/>
-              <a:t>. We can use this data assuming  </a:t>
-            </a:r>
-            <a:r>
-              <a:rPr lang="en-US" dirty="0" err="1"/>
-              <a:t>srcip</a:t>
-            </a:r>
-            <a:r>
-              <a:rPr lang="en-US" dirty="0"/>
-              <a:t> are coming from application running inside a VM.</a:t>
-            </a:r>
           </a:p>
         </p:txBody>
       </p:sp>

</xml_diff>